<commit_message>
Adding updates for Week 10
</commit_message>
<xml_diff>
--- a/ClassMaterials/Week10/Week10.pptx
+++ b/ClassMaterials/Week10/Week10.pptx
@@ -3796,7 +3796,7 @@
           <a:p>
             <a:r>
               <a:rPr lang="en-US" dirty="0"/>
-              <a:t>Week 7 – </a:t>
+              <a:t>Week 7 – GenAI in Production</a:t>
             </a:r>
           </a:p>
         </p:txBody>
@@ -3817,12 +3817,93 @@
             <p:ph idx="1"/>
           </p:nvPr>
         </p:nvSpPr>
-        <p:spPr/>
-        <p:txBody>
-          <a:bodyPr/>
-          <a:lstStyle/>
-          <a:p>
-            <a:endParaRPr lang="en-US"/>
+        <p:spPr>
+          <a:xfrm>
+            <a:off x="838199" y="1602105"/>
+            <a:ext cx="11115675" cy="4851082"/>
+          </a:xfrm>
+        </p:spPr>
+        <p:txBody>
+          <a:bodyPr>
+            <a:normAutofit fontScale="92500" lnSpcReduction="10000"/>
+          </a:bodyPr>
+          <a:lstStyle/>
+          <a:p>
+            <a:r>
+              <a:rPr lang="en-US" dirty="0"/>
+              <a:t>LLMs do not hold a “model” of a system</a:t>
+            </a:r>
+          </a:p>
+          <a:p>
+            <a:endParaRPr lang="en-US" dirty="0"/>
+          </a:p>
+          <a:p>
+            <a:r>
+              <a:rPr lang="en-US" dirty="0"/>
+              <a:t>There’s no “end goal” when it’s writing</a:t>
+            </a:r>
+          </a:p>
+          <a:p>
+            <a:pPr lvl="1"/>
+            <a:r>
+              <a:rPr lang="en-US" dirty="0"/>
+              <a:t>Good a paragraphs</a:t>
+            </a:r>
+          </a:p>
+          <a:p>
+            <a:pPr lvl="1"/>
+            <a:r>
+              <a:rPr lang="en-US" dirty="0"/>
+              <a:t>Bad at books</a:t>
+            </a:r>
+          </a:p>
+          <a:p>
+            <a:pPr lvl="1"/>
+            <a:r>
+              <a:rPr lang="en-US" dirty="0"/>
+              <a:t>We need to provide scaffolding</a:t>
+            </a:r>
+          </a:p>
+          <a:p>
+            <a:pPr lvl="1"/>
+            <a:endParaRPr lang="en-US" dirty="0"/>
+          </a:p>
+          <a:p>
+            <a:r>
+              <a:rPr lang="en-US" dirty="0"/>
+              <a:t>If you don’t provide something, AI might hallucinate it</a:t>
+            </a:r>
+          </a:p>
+          <a:p>
+            <a:endParaRPr lang="en-US" dirty="0"/>
+          </a:p>
+          <a:p>
+            <a:r>
+              <a:rPr lang="en-US" dirty="0"/>
+              <a:t>LLMs cannot be adjusted to work like normal computational systems</a:t>
+            </a:r>
+          </a:p>
+          <a:p>
+            <a:pPr lvl="1"/>
+            <a:r>
+              <a:rPr lang="en-US" dirty="0"/>
+              <a:t>You need a plan – Error Handling, Reprocessing, etc. </a:t>
+            </a:r>
+          </a:p>
+          <a:p>
+            <a:pPr lvl="1"/>
+            <a:r>
+              <a:rPr lang="en-US" dirty="0"/>
+              <a:t>Requests can be </a:t>
+            </a:r>
+            <a:r>
+              <a:rPr lang="en-US" i="1" dirty="0"/>
+              <a:t>slow</a:t>
+            </a:r>
+            <a:r>
+              <a:rPr lang="en-US" dirty="0"/>
+              <a:t> </a:t>
+            </a:r>
           </a:p>
         </p:txBody>
       </p:sp>

</xml_diff>